<commit_message>
32x32 sort works, but need to cut down shared mem used
</commit_message>
<xml_diff>
--- a/Slides/ggl001-HelloTriangle.pptx
+++ b/Slides/ggl001-HelloTriangle.pptx
@@ -183,6 +183,14 @@
 </p:presentation>
 </file>
 
+<file path=ppt/revisionInfo.xml><?xml version="1.0" encoding="utf-8"?>
+<p1510:revInfo xmlns:a="http://schemas.openxmlformats.org/drawingml/2006/main" xmlns:r="http://schemas.openxmlformats.org/officeDocument/2006/relationships" xmlns:p1510="http://schemas.microsoft.com/office/powerpoint/2015/10/main">
+  <p1510:revLst>
+    <p1510:client id="{624DE5A2-36A7-1460-A16D-AD18C891EA6D}" v="55" dt="2020-09-09T10:07:59.019"/>
+  </p1510:revLst>
+</p1510:revInfo>
+</file>
+
 <file path=ppt/notesMasters/notesMaster1.xml><?xml version="1.0" encoding="utf-8"?>
 <p:notesMaster xmlns:a="http://schemas.openxmlformats.org/drawingml/2006/main" xmlns:r="http://schemas.openxmlformats.org/officeDocument/2006/relationships" xmlns:p="http://schemas.openxmlformats.org/presentationml/2006/main">
   <p:cSld>
@@ -266,7 +274,7 @@
             <a:fld id="{C0D025BB-35D5-419D-8ED2-E5EDB67F143A}" type="datetimeFigureOut">
               <a:rPr lang="en-US" smtClean="0"/>
               <a:pPr/>
-              <a:t>7/10/2020</a:t>
+              <a:t>9/9/2020</a:t>
             </a:fld>
             <a:endParaRPr lang="en-US"/>
           </a:p>
@@ -5657,7 +5665,7 @@
             </a:r>
             <a:r>
               <a:rPr lang="en-US" dirty="0" err="1"/>
-              <a:t>legegyser</a:t>
+              <a:t>legegyszer</a:t>
             </a:r>
             <a:r>
               <a:rPr lang="hu-HU" dirty="0"/>
@@ -5673,7 +5681,15 @@
             </a:r>
             <a:r>
               <a:rPr lang="en-US" dirty="0"/>
-              <a:t> se, de </a:t>
+              <a:t> </a:t>
+            </a:r>
+            <a:r>
+              <a:rPr lang="en-US" dirty="0" err="1"/>
+              <a:t>sem</a:t>
+            </a:r>
+            <a:r>
+              <a:rPr lang="en-US" dirty="0"/>
+              <a:t>, de </a:t>
             </a:r>
             <a:r>
               <a:rPr lang="en-US" dirty="0" err="1"/>
@@ -29922,7 +29938,7 @@
             <a:fld id="{77DAEA1A-6276-4434-840E-9C81C04BC3C1}" type="datetimeFigureOut">
               <a:rPr lang="en-US" smtClean="0"/>
               <a:pPr/>
-              <a:t>7/10/2020</a:t>
+              <a:t>9/9/2020</a:t>
             </a:fld>
             <a:endParaRPr lang="en-US"/>
           </a:p>
@@ -32452,7 +32468,7 @@
         </p:nvSpPr>
         <p:spPr/>
         <p:txBody>
-          <a:bodyPr>
+          <a:bodyPr vert="horz" lIns="91440" tIns="45720" rIns="91440" bIns="45720" rtlCol="0" anchor="t">
             <a:normAutofit fontScale="92500" lnSpcReduction="10000"/>
           </a:bodyPr>
           <a:lstStyle/>
@@ -32567,17 +32583,50 @@
           </a:p>
           <a:p>
             <a:r>
-              <a:rPr lang="en-US" sz="2000" dirty="0"/>
-              <a:t>		&amp;</a:t>
-            </a:r>
-            <a:r>
-              <a:rPr lang="en-US" sz="2000" dirty="0" err="1"/>
+              <a:rPr lang="en-US" sz="2000" dirty="0">
+                <a:latin typeface="Courier New"/>
+                <a:cs typeface="Courier New"/>
+              </a:rPr>
+              <a:t>		</a:t>
+            </a:r>
+            <a:r>
+              <a:rPr lang="en-US" sz="2000" strike="sngStrike" dirty="0">
+                <a:solidFill>
+                  <a:srgbClr val="FF0000"/>
+                </a:solidFill>
+                <a:latin typeface="Courier New"/>
+                <a:cs typeface="Courier New"/>
+              </a:rPr>
+              <a:t>&amp;</a:t>
+            </a:r>
+            <a:r>
+              <a:rPr lang="en-US" sz="2000" strike="sngStrike" dirty="0" err="1">
+                <a:solidFill>
+                  <a:srgbClr val="FF0000"/>
+                </a:solidFill>
+                <a:latin typeface="Courier New"/>
+                <a:cs typeface="Courier New"/>
+              </a:rPr>
               <a:t>swapChainFullscreenDesc</a:t>
             </a:r>
             <a:r>
-              <a:rPr lang="en-US" sz="2000" dirty="0"/>
+              <a:rPr lang="en-US" sz="2000" strike="sngStrike" dirty="0">
+                <a:solidFill>
+                  <a:srgbClr val="FF0000"/>
+                </a:solidFill>
+                <a:latin typeface="Courier New"/>
+                <a:cs typeface="Courier New"/>
+              </a:rPr>
               <a:t>,</a:t>
             </a:r>
+            <a:r>
+              <a:rPr lang="en-US" sz="2100" dirty="0">
+                <a:latin typeface="Courier New"/>
+                <a:cs typeface="Courier New"/>
+              </a:rPr>
+              <a:t> NULL,</a:t>
+            </a:r>
+            <a:endParaRPr lang="en-US" sz="2100" dirty="0"/>
           </a:p>
           <a:p>
             <a:r>
@@ -32796,16 +32845,18 @@
         </p:nvSpPr>
         <p:spPr/>
         <p:txBody>
-          <a:bodyPr/>
+          <a:bodyPr vert="horz" lIns="91440" tIns="45720" rIns="91440" bIns="45720" rtlCol="0" anchor="t">
+            <a:normAutofit/>
+          </a:bodyPr>
           <a:lstStyle/>
           <a:p>
             <a:r>
-              <a:rPr lang="hu-HU" dirty="0">
-                <a:hlinkClick r:id="rId2"/>
-              </a:rPr>
-              <a:t>http://cg.iit.bme.hu/portal/oktatott-targyak/grafikus-jatekok-fejlesztese</a:t>
-            </a:r>
-            <a:endParaRPr lang="en-US" dirty="0"/>
+              <a:rPr lang="hu-HU" dirty="0" err="1"/>
+              <a:t>Moodle</a:t>
+            </a:r>
+            <a:endParaRPr lang="en-US" dirty="0" err="1">
+              <a:cs typeface="Calibri"/>
+            </a:endParaRPr>
           </a:p>
           <a:p>
             <a:endParaRPr lang="hu-HU" dirty="0"/>
@@ -35525,7 +35576,9 @@
           </a:xfrm>
         </p:spPr>
         <p:txBody>
-          <a:bodyPr/>
+          <a:bodyPr vert="horz" lIns="91440" tIns="45720" rIns="91440" bIns="45720" rtlCol="0" anchor="t">
+            <a:normAutofit/>
+          </a:bodyPr>
           <a:lstStyle/>
           <a:p>
             <a:r>
@@ -35546,7 +35599,7 @@
             </a:r>
             <a:r>
               <a:rPr lang="en-US" dirty="0"/>
-              <a:t> Visual Studio 2017/2019-et </a:t>
+              <a:t> Visual Studio 2015/2019-et </a:t>
             </a:r>
             <a:r>
               <a:rPr lang="en-US" dirty="0" err="1"/>
@@ -35668,7 +35721,7 @@
             <a:pPr lvl="1"/>
             <a:r>
               <a:rPr lang="en-US" dirty="0" err="1"/>
-              <a:t>Részletes</a:t>
+              <a:t>részletes</a:t>
             </a:r>
             <a:r>
               <a:rPr lang="en-US" dirty="0"/>
@@ -38135,52 +38188,19 @@
         </p:nvSpPr>
         <p:spPr/>
         <p:txBody>
-          <a:bodyPr>
+          <a:bodyPr vert="horz" lIns="91440" tIns="45720" rIns="91440" bIns="45720" rtlCol="0" anchor="t">
             <a:normAutofit/>
           </a:bodyPr>
           <a:lstStyle/>
           <a:p>
             <a:r>
               <a:rPr lang="en-US" dirty="0"/>
-              <a:t>A zip a “</a:t>
-            </a:r>
-            <a:r>
-              <a:rPr lang="en-US" dirty="0" err="1"/>
-              <a:t>Laborok</a:t>
-            </a:r>
-            <a:r>
-              <a:rPr lang="en-US" dirty="0"/>
-              <a:t>” al-</a:t>
-            </a:r>
-            <a:r>
-              <a:rPr lang="en-US" dirty="0" err="1"/>
-              <a:t>oldalon</a:t>
-            </a:r>
-            <a:r>
-              <a:rPr lang="en-US" dirty="0"/>
-              <a:t> </a:t>
-            </a:r>
-            <a:r>
-              <a:rPr lang="en-US" dirty="0" err="1"/>
-              <a:t>található</a:t>
-            </a:r>
-            <a:r>
-              <a:rPr lang="en-US" dirty="0"/>
-              <a:t> a </a:t>
-            </a:r>
-            <a:r>
-              <a:rPr lang="en-US" dirty="0" err="1"/>
-              <a:t>tárgy</a:t>
-            </a:r>
-            <a:r>
-              <a:rPr lang="en-US" dirty="0"/>
-              <a:t> </a:t>
-            </a:r>
-            <a:r>
-              <a:rPr lang="en-US" dirty="0" err="1"/>
-              <a:t>oldalán</a:t>
-            </a:r>
-            <a:endParaRPr lang="en-US" dirty="0"/>
+              <a:t>A zip a Moodle-</a:t>
+            </a:r>
+            <a:r>
+              <a:rPr lang="en-US" dirty="0" err="1"/>
+              <a:t>ról</a:t>
+            </a:r>
           </a:p>
           <a:p>
             <a:r>

</xml_diff>